<commit_message>
Cleanup on decision tree for which trait to use.
</commit_message>
<xml_diff>
--- a/Planning/Trait Types.pptx
+++ b/Planning/Trait Types.pptx
@@ -3971,8 +3971,8 @@
         </p:nvSpPr>
         <p:spPr>
           <a:xfrm>
-            <a:off x="6409779" y="1970162"/>
-            <a:ext cx="1592103" cy="369332"/>
+            <a:off x="5977438" y="2200621"/>
+            <a:ext cx="1222359" cy="923330"/>
           </a:xfrm>
           <a:prstGeom prst="rect">
             <a:avLst/>
@@ -3980,14 +3980,14 @@
           <a:noFill/>
         </p:spPr>
         <p:txBody>
-          <a:bodyPr wrap="none" rtlCol="0">
+          <a:bodyPr wrap="square" rtlCol="0">
             <a:spAutoFit/>
           </a:bodyPr>
           <a:lstStyle/>
           <a:p>
             <a:r>
               <a:rPr lang="en-US" dirty="0"/>
-              <a:t>Other modules</a:t>
+              <a:t> Only other modules</a:t>
             </a:r>
           </a:p>
         </p:txBody>
@@ -4006,7 +4006,7 @@
         </p:nvSpPr>
         <p:spPr>
           <a:xfrm>
-            <a:off x="6715411" y="2497435"/>
+            <a:off x="7024332" y="3214132"/>
             <a:ext cx="1777147" cy="923330"/>
           </a:xfrm>
           <a:prstGeom prst="rect">
@@ -4046,7 +4046,7 @@
         </p:nvSpPr>
         <p:spPr>
           <a:xfrm>
-            <a:off x="6459090" y="3764123"/>
+            <a:off x="6511691" y="4404502"/>
             <a:ext cx="512641" cy="369332"/>
           </a:xfrm>
           <a:prstGeom prst="rect">
@@ -4081,8 +4081,8 @@
         </p:nvSpPr>
         <p:spPr>
           <a:xfrm>
-            <a:off x="8121426" y="4308565"/>
-            <a:ext cx="1444434" cy="369332"/>
+            <a:off x="8430347" y="4938763"/>
+            <a:ext cx="1586716" cy="400110"/>
           </a:xfrm>
           <a:prstGeom prst="rect">
             <a:avLst/>
@@ -4096,7 +4096,7 @@
           <a:lstStyle/>
           <a:p>
             <a:r>
-              <a:rPr lang="en-US" b="1" dirty="0" err="1"/>
+              <a:rPr lang="en-US" sz="2000" b="1" dirty="0" err="1"/>
               <a:t>OptionalTrait</a:t>
             </a:r>
             <a:endParaRPr lang="en-US" b="1" dirty="0"/>
@@ -4117,8 +4117,8 @@
         </p:nvSpPr>
         <p:spPr>
           <a:xfrm>
-            <a:off x="5977291" y="4312509"/>
-            <a:ext cx="1476238" cy="369332"/>
+            <a:off x="5859659" y="4938763"/>
+            <a:ext cx="1625958" cy="400110"/>
           </a:xfrm>
           <a:prstGeom prst="rect">
             <a:avLst/>
@@ -4132,10 +4132,10 @@
           <a:lstStyle/>
           <a:p>
             <a:r>
-              <a:rPr lang="en-US" b="1" dirty="0" err="1"/>
+              <a:rPr lang="en-US" sz="2000" b="1" dirty="0" err="1"/>
               <a:t>RequiredTrait</a:t>
             </a:r>
-            <a:endParaRPr lang="en-US" b="1" dirty="0"/>
+            <a:endParaRPr lang="en-US" sz="2000" b="1" dirty="0"/>
           </a:p>
         </p:txBody>
       </p:sp>
@@ -4153,8 +4153,8 @@
         </p:nvSpPr>
         <p:spPr>
           <a:xfrm>
-            <a:off x="3321278" y="1955289"/>
-            <a:ext cx="1786066" cy="369332"/>
+            <a:off x="2884743" y="1755965"/>
+            <a:ext cx="1439656" cy="646331"/>
           </a:xfrm>
           <a:prstGeom prst="rect">
             <a:avLst/>
@@ -4166,14 +4166,14 @@
           </a:solidFill>
         </p:spPr>
         <p:txBody>
-          <a:bodyPr wrap="none" rtlCol="0">
+          <a:bodyPr wrap="square" rtlCol="0">
             <a:spAutoFit/>
           </a:bodyPr>
           <a:lstStyle/>
           <a:p>
             <a:r>
               <a:rPr lang="en-US" dirty="0"/>
-              <a:t>This module only</a:t>
+              <a:t>Only this module</a:t>
             </a:r>
           </a:p>
         </p:txBody>
@@ -4192,8 +4192,8 @@
         </p:nvSpPr>
         <p:spPr>
           <a:xfrm>
-            <a:off x="3604571" y="4312509"/>
-            <a:ext cx="1284711" cy="369332"/>
+            <a:off x="3814638" y="4263081"/>
+            <a:ext cx="1408527" cy="400110"/>
           </a:xfrm>
           <a:prstGeom prst="rect">
             <a:avLst/>
@@ -4207,10 +4207,10 @@
           <a:lstStyle/>
           <a:p>
             <a:r>
-              <a:rPr lang="en-US" b="1" dirty="0" err="1"/>
+              <a:rPr lang="en-US" sz="2000" b="1" dirty="0" err="1"/>
               <a:t>PrivateTrait</a:t>
             </a:r>
-            <a:endParaRPr lang="en-US" b="1" dirty="0"/>
+            <a:endParaRPr lang="en-US" sz="2000" b="1" dirty="0"/>
           </a:p>
         </p:txBody>
       </p:sp>
@@ -4229,7 +4229,7 @@
         <p:spPr>
           <a:xfrm>
             <a:off x="2241758" y="5991211"/>
-            <a:ext cx="1302664" cy="369332"/>
+            <a:ext cx="1430648" cy="400110"/>
           </a:xfrm>
           <a:prstGeom prst="rect">
             <a:avLst/>
@@ -4243,10 +4243,10 @@
           <a:lstStyle/>
           <a:p>
             <a:r>
-              <a:rPr lang="en-US" b="1" dirty="0" err="1"/>
+              <a:rPr lang="en-US" sz="2000" b="1" dirty="0" err="1"/>
               <a:t>OwnedTrait</a:t>
             </a:r>
-            <a:endParaRPr lang="en-US" b="1" dirty="0"/>
+            <a:endParaRPr lang="en-US" sz="2000" b="1" dirty="0"/>
           </a:p>
         </p:txBody>
       </p:sp>
@@ -4265,7 +4265,7 @@
         <p:spPr>
           <a:xfrm>
             <a:off x="0" y="5989083"/>
-            <a:ext cx="1619674" cy="369332"/>
+            <a:ext cx="1784976" cy="400110"/>
           </a:xfrm>
           <a:prstGeom prst="rect">
             <a:avLst/>
@@ -4279,10 +4279,10 @@
           <a:lstStyle/>
           <a:p>
             <a:r>
-              <a:rPr lang="en-US" b="1" dirty="0" err="1"/>
+              <a:rPr lang="en-US" sz="2000" b="1" dirty="0" err="1"/>
               <a:t>GeneratedTrait</a:t>
             </a:r>
-            <a:endParaRPr lang="en-US" b="1" dirty="0"/>
+            <a:endParaRPr lang="en-US" sz="2000" b="1" dirty="0"/>
           </a:p>
         </p:txBody>
       </p:sp>
@@ -4300,8 +4300,8 @@
         </p:nvSpPr>
         <p:spPr>
           <a:xfrm>
-            <a:off x="10467908" y="2771861"/>
-            <a:ext cx="1277657" cy="369332"/>
+            <a:off x="10467908" y="2511000"/>
+            <a:ext cx="1403718" cy="400110"/>
           </a:xfrm>
           <a:prstGeom prst="rect">
             <a:avLst/>
@@ -4315,7 +4315,7 @@
           <a:lstStyle/>
           <a:p>
             <a:r>
-              <a:rPr lang="en-US" b="1" dirty="0" err="1"/>
+              <a:rPr lang="en-US" sz="2000" b="1" dirty="0" err="1"/>
               <a:t>SharedTrait</a:t>
             </a:r>
             <a:endParaRPr lang="en-US" b="1" dirty="0"/>
@@ -4376,7 +4376,7 @@
         </p:nvSpPr>
         <p:spPr>
           <a:xfrm>
-            <a:off x="1106106" y="3764123"/>
+            <a:off x="1858234" y="3612721"/>
             <a:ext cx="512641" cy="369332"/>
           </a:xfrm>
           <a:prstGeom prst="rect">
@@ -4411,7 +4411,7 @@
         </p:nvSpPr>
         <p:spPr>
           <a:xfrm>
-            <a:off x="4003912" y="3764123"/>
+            <a:off x="4033023" y="3616245"/>
             <a:ext cx="486030" cy="369332"/>
           </a:xfrm>
           <a:prstGeom prst="rect">
@@ -4446,7 +4446,7 @@
         </p:nvSpPr>
         <p:spPr>
           <a:xfrm>
-            <a:off x="720704" y="4358675"/>
+            <a:off x="720704" y="4259819"/>
             <a:ext cx="2039357" cy="923330"/>
           </a:xfrm>
           <a:prstGeom prst="rect">
@@ -4556,7 +4556,7 @@
         </p:nvSpPr>
         <p:spPr>
           <a:xfrm>
-            <a:off x="8194294" y="3774304"/>
+            <a:off x="8799781" y="4404502"/>
             <a:ext cx="486030" cy="369332"/>
           </a:xfrm>
           <a:prstGeom prst="rect">
@@ -4591,8 +4591,8 @@
         </p:nvSpPr>
         <p:spPr>
           <a:xfrm>
-            <a:off x="9825250" y="1987807"/>
-            <a:ext cx="630301" cy="369332"/>
+            <a:off x="8564294" y="1755965"/>
+            <a:ext cx="1310487" cy="369332"/>
           </a:xfrm>
           <a:prstGeom prst="rect">
             <a:avLst/>
@@ -4607,7 +4607,7 @@
           <a:p>
             <a:r>
               <a:rPr lang="en-US" dirty="0"/>
-              <a:t>Both</a:t>
+              <a:t>Any module</a:t>
             </a:r>
           </a:p>
         </p:txBody>
@@ -4623,14 +4623,375 @@
           </p:cNvPr>
           <p:cNvCxnSpPr>
             <a:cxnSpLocks/>
+            <a:stCxn id="5" idx="1"/>
             <a:endCxn id="19" idx="0"/>
           </p:cNvCxnSpPr>
           <p:nvPr/>
         </p:nvCxnSpPr>
         <p:spPr>
           <a:xfrm flipH="1">
-            <a:off x="3330644" y="1807868"/>
-            <a:ext cx="1509337" cy="828066"/>
+            <a:off x="3330644" y="1484703"/>
+            <a:ext cx="1509337" cy="1151231"/>
+          </a:xfrm>
+          <a:prstGeom prst="line">
+            <a:avLst/>
+          </a:prstGeom>
+          <a:ln w="19050">
+            <a:solidFill>
+              <a:schemeClr val="tx1"/>
+            </a:solidFill>
+          </a:ln>
+        </p:spPr>
+        <p:style>
+          <a:lnRef idx="1">
+            <a:schemeClr val="accent1"/>
+          </a:lnRef>
+          <a:fillRef idx="0">
+            <a:schemeClr val="accent1"/>
+          </a:fillRef>
+          <a:effectRef idx="0">
+            <a:schemeClr val="accent1"/>
+          </a:effectRef>
+          <a:fontRef idx="minor">
+            <a:schemeClr val="tx1"/>
+          </a:fontRef>
+        </p:style>
+      </p:cxnSp>
+      <p:cxnSp>
+        <p:nvCxnSpPr>
+          <p:cNvPr id="33" name="Straight Connector 32">
+            <a:extLst>
+              <a:ext uri="{FF2B5EF4-FFF2-40B4-BE49-F238E27FC236}">
+                <a16:creationId xmlns:a16="http://schemas.microsoft.com/office/drawing/2014/main" id="{BBEAC9A7-4C7F-D4D1-E429-5982C6AC19BD}"/>
+              </a:ext>
+            </a:extLst>
+          </p:cNvPr>
+          <p:cNvCxnSpPr>
+            <a:cxnSpLocks/>
+            <a:stCxn id="5" idx="2"/>
+            <a:endCxn id="8" idx="0"/>
+          </p:cNvCxnSpPr>
+          <p:nvPr/>
+        </p:nvCxnSpPr>
+        <p:spPr>
+          <a:xfrm>
+            <a:off x="5859660" y="1807868"/>
+            <a:ext cx="2053246" cy="1406264"/>
+          </a:xfrm>
+          <a:prstGeom prst="line">
+            <a:avLst/>
+          </a:prstGeom>
+          <a:ln w="19050">
+            <a:solidFill>
+              <a:schemeClr val="tx1"/>
+            </a:solidFill>
+          </a:ln>
+        </p:spPr>
+        <p:style>
+          <a:lnRef idx="1">
+            <a:schemeClr val="accent1"/>
+          </a:lnRef>
+          <a:fillRef idx="0">
+            <a:schemeClr val="accent1"/>
+          </a:fillRef>
+          <a:effectRef idx="0">
+            <a:schemeClr val="accent1"/>
+          </a:effectRef>
+          <a:fontRef idx="minor">
+            <a:schemeClr val="tx1"/>
+          </a:fontRef>
+        </p:style>
+      </p:cxnSp>
+      <p:cxnSp>
+        <p:nvCxnSpPr>
+          <p:cNvPr id="36" name="Straight Connector 35">
+            <a:extLst>
+              <a:ext uri="{FF2B5EF4-FFF2-40B4-BE49-F238E27FC236}">
+                <a16:creationId xmlns:a16="http://schemas.microsoft.com/office/drawing/2014/main" id="{65B86E15-3F70-D854-B2E6-5E58FD7D6EBA}"/>
+              </a:ext>
+            </a:extLst>
+          </p:cNvPr>
+          <p:cNvCxnSpPr>
+            <a:cxnSpLocks/>
+            <a:stCxn id="5" idx="3"/>
+            <a:endCxn id="16" idx="1"/>
+          </p:cNvCxnSpPr>
+          <p:nvPr/>
+        </p:nvCxnSpPr>
+        <p:spPr>
+          <a:xfrm>
+            <a:off x="6879338" y="1484703"/>
+            <a:ext cx="3588570" cy="1226352"/>
+          </a:xfrm>
+          <a:prstGeom prst="line">
+            <a:avLst/>
+          </a:prstGeom>
+          <a:ln w="19050">
+            <a:solidFill>
+              <a:schemeClr val="tx1"/>
+            </a:solidFill>
+          </a:ln>
+        </p:spPr>
+        <p:style>
+          <a:lnRef idx="1">
+            <a:schemeClr val="accent1"/>
+          </a:lnRef>
+          <a:fillRef idx="0">
+            <a:schemeClr val="accent1"/>
+          </a:fillRef>
+          <a:effectRef idx="0">
+            <a:schemeClr val="accent1"/>
+          </a:effectRef>
+          <a:fontRef idx="minor">
+            <a:schemeClr val="tx1"/>
+          </a:fontRef>
+        </p:style>
+      </p:cxnSp>
+      <p:cxnSp>
+        <p:nvCxnSpPr>
+          <p:cNvPr id="41" name="Straight Connector 40">
+            <a:extLst>
+              <a:ext uri="{FF2B5EF4-FFF2-40B4-BE49-F238E27FC236}">
+                <a16:creationId xmlns:a16="http://schemas.microsoft.com/office/drawing/2014/main" id="{0E786ACA-9AD0-6D3D-3DE2-5CF660C6CF75}"/>
+              </a:ext>
+            </a:extLst>
+          </p:cNvPr>
+          <p:cNvCxnSpPr>
+            <a:cxnSpLocks/>
+            <a:stCxn id="19" idx="2"/>
+            <a:endCxn id="23" idx="0"/>
+          </p:cNvCxnSpPr>
+          <p:nvPr/>
+        </p:nvCxnSpPr>
+        <p:spPr>
+          <a:xfrm flipH="1">
+            <a:off x="1740383" y="3282265"/>
+            <a:ext cx="1590261" cy="977554"/>
+          </a:xfrm>
+          <a:prstGeom prst="line">
+            <a:avLst/>
+          </a:prstGeom>
+          <a:ln w="19050">
+            <a:solidFill>
+              <a:schemeClr val="tx1"/>
+            </a:solidFill>
+          </a:ln>
+        </p:spPr>
+        <p:style>
+          <a:lnRef idx="1">
+            <a:schemeClr val="accent1"/>
+          </a:lnRef>
+          <a:fillRef idx="0">
+            <a:schemeClr val="accent1"/>
+          </a:fillRef>
+          <a:effectRef idx="0">
+            <a:schemeClr val="accent1"/>
+          </a:effectRef>
+          <a:fontRef idx="minor">
+            <a:schemeClr val="tx1"/>
+          </a:fontRef>
+        </p:style>
+      </p:cxnSp>
+      <p:cxnSp>
+        <p:nvCxnSpPr>
+          <p:cNvPr id="44" name="Straight Connector 43">
+            <a:extLst>
+              <a:ext uri="{FF2B5EF4-FFF2-40B4-BE49-F238E27FC236}">
+                <a16:creationId xmlns:a16="http://schemas.microsoft.com/office/drawing/2014/main" id="{84C07C5A-449E-6282-5356-8BF4E9B9BF3C}"/>
+              </a:ext>
+            </a:extLst>
+          </p:cNvPr>
+          <p:cNvCxnSpPr>
+            <a:cxnSpLocks/>
+            <a:stCxn id="19" idx="2"/>
+            <a:endCxn id="13" idx="0"/>
+          </p:cNvCxnSpPr>
+          <p:nvPr/>
+        </p:nvCxnSpPr>
+        <p:spPr>
+          <a:xfrm>
+            <a:off x="3330644" y="3282265"/>
+            <a:ext cx="1188258" cy="980816"/>
+          </a:xfrm>
+          <a:prstGeom prst="line">
+            <a:avLst/>
+          </a:prstGeom>
+          <a:ln w="19050">
+            <a:solidFill>
+              <a:schemeClr val="tx1"/>
+            </a:solidFill>
+          </a:ln>
+        </p:spPr>
+        <p:style>
+          <a:lnRef idx="1">
+            <a:schemeClr val="accent1"/>
+          </a:lnRef>
+          <a:fillRef idx="0">
+            <a:schemeClr val="accent1"/>
+          </a:fillRef>
+          <a:effectRef idx="0">
+            <a:schemeClr val="accent1"/>
+          </a:effectRef>
+          <a:fontRef idx="minor">
+            <a:schemeClr val="tx1"/>
+          </a:fontRef>
+        </p:style>
+      </p:cxnSp>
+      <p:cxnSp>
+        <p:nvCxnSpPr>
+          <p:cNvPr id="47" name="Straight Connector 46">
+            <a:extLst>
+              <a:ext uri="{FF2B5EF4-FFF2-40B4-BE49-F238E27FC236}">
+                <a16:creationId xmlns:a16="http://schemas.microsoft.com/office/drawing/2014/main" id="{B76E7720-82B7-84D0-B2CE-CB0B6A6C66AE}"/>
+              </a:ext>
+            </a:extLst>
+          </p:cNvPr>
+          <p:cNvCxnSpPr>
+            <a:cxnSpLocks/>
+            <a:stCxn id="8" idx="2"/>
+            <a:endCxn id="10" idx="0"/>
+          </p:cNvCxnSpPr>
+          <p:nvPr/>
+        </p:nvCxnSpPr>
+        <p:spPr>
+          <a:xfrm>
+            <a:off x="7912906" y="4137462"/>
+            <a:ext cx="1310799" cy="801301"/>
+          </a:xfrm>
+          <a:prstGeom prst="line">
+            <a:avLst/>
+          </a:prstGeom>
+          <a:ln w="19050">
+            <a:solidFill>
+              <a:schemeClr val="tx1"/>
+            </a:solidFill>
+          </a:ln>
+        </p:spPr>
+        <p:style>
+          <a:lnRef idx="1">
+            <a:schemeClr val="accent1"/>
+          </a:lnRef>
+          <a:fillRef idx="0">
+            <a:schemeClr val="accent1"/>
+          </a:fillRef>
+          <a:effectRef idx="0">
+            <a:schemeClr val="accent1"/>
+          </a:effectRef>
+          <a:fontRef idx="minor">
+            <a:schemeClr val="tx1"/>
+          </a:fontRef>
+        </p:style>
+      </p:cxnSp>
+      <p:cxnSp>
+        <p:nvCxnSpPr>
+          <p:cNvPr id="50" name="Straight Connector 49">
+            <a:extLst>
+              <a:ext uri="{FF2B5EF4-FFF2-40B4-BE49-F238E27FC236}">
+                <a16:creationId xmlns:a16="http://schemas.microsoft.com/office/drawing/2014/main" id="{8E3E8E1A-D34B-9E34-97F7-79B15C9CE0A3}"/>
+              </a:ext>
+            </a:extLst>
+          </p:cNvPr>
+          <p:cNvCxnSpPr>
+            <a:cxnSpLocks/>
+            <a:stCxn id="8" idx="2"/>
+            <a:endCxn id="11" idx="0"/>
+          </p:cNvCxnSpPr>
+          <p:nvPr/>
+        </p:nvCxnSpPr>
+        <p:spPr>
+          <a:xfrm flipH="1">
+            <a:off x="6672638" y="4137462"/>
+            <a:ext cx="1240268" cy="801301"/>
+          </a:xfrm>
+          <a:prstGeom prst="line">
+            <a:avLst/>
+          </a:prstGeom>
+          <a:ln w="19050">
+            <a:solidFill>
+              <a:schemeClr val="tx1"/>
+            </a:solidFill>
+          </a:ln>
+        </p:spPr>
+        <p:style>
+          <a:lnRef idx="1">
+            <a:schemeClr val="accent1"/>
+          </a:lnRef>
+          <a:fillRef idx="0">
+            <a:schemeClr val="accent1"/>
+          </a:fillRef>
+          <a:effectRef idx="0">
+            <a:schemeClr val="accent1"/>
+          </a:effectRef>
+          <a:fontRef idx="minor">
+            <a:schemeClr val="tx1"/>
+          </a:fontRef>
+        </p:style>
+      </p:cxnSp>
+      <p:cxnSp>
+        <p:nvCxnSpPr>
+          <p:cNvPr id="56" name="Straight Connector 55">
+            <a:extLst>
+              <a:ext uri="{FF2B5EF4-FFF2-40B4-BE49-F238E27FC236}">
+                <a16:creationId xmlns:a16="http://schemas.microsoft.com/office/drawing/2014/main" id="{02F4CC9B-7489-9964-2E41-4ECFA3D53B8C}"/>
+              </a:ext>
+            </a:extLst>
+          </p:cNvPr>
+          <p:cNvCxnSpPr>
+            <a:cxnSpLocks/>
+            <a:stCxn id="23" idx="2"/>
+            <a:endCxn id="15" idx="0"/>
+          </p:cNvCxnSpPr>
+          <p:nvPr/>
+        </p:nvCxnSpPr>
+        <p:spPr>
+          <a:xfrm flipH="1">
+            <a:off x="892488" y="5183149"/>
+            <a:ext cx="847895" cy="805934"/>
+          </a:xfrm>
+          <a:prstGeom prst="line">
+            <a:avLst/>
+          </a:prstGeom>
+          <a:ln w="19050">
+            <a:solidFill>
+              <a:schemeClr val="tx1"/>
+            </a:solidFill>
+          </a:ln>
+        </p:spPr>
+        <p:style>
+          <a:lnRef idx="1">
+            <a:schemeClr val="accent1"/>
+          </a:lnRef>
+          <a:fillRef idx="0">
+            <a:schemeClr val="accent1"/>
+          </a:fillRef>
+          <a:effectRef idx="0">
+            <a:schemeClr val="accent1"/>
+          </a:effectRef>
+          <a:fontRef idx="minor">
+            <a:schemeClr val="tx1"/>
+          </a:fontRef>
+        </p:style>
+      </p:cxnSp>
+      <p:cxnSp>
+        <p:nvCxnSpPr>
+          <p:cNvPr id="59" name="Straight Connector 58">
+            <a:extLst>
+              <a:ext uri="{FF2B5EF4-FFF2-40B4-BE49-F238E27FC236}">
+                <a16:creationId xmlns:a16="http://schemas.microsoft.com/office/drawing/2014/main" id="{30175950-4F58-ED9B-69BB-4BDFCC0D8EED}"/>
+              </a:ext>
+            </a:extLst>
+          </p:cNvPr>
+          <p:cNvCxnSpPr>
+            <a:cxnSpLocks/>
+            <a:stCxn id="23" idx="2"/>
+            <a:endCxn id="14" idx="0"/>
+          </p:cNvCxnSpPr>
+          <p:nvPr/>
+        </p:nvCxnSpPr>
+        <p:spPr>
+          <a:xfrm>
+            <a:off x="1740383" y="5183149"/>
+            <a:ext cx="1216699" cy="808062"/>
           </a:xfrm>
           <a:prstGeom prst="line">
             <a:avLst/>

</xml_diff>